<commit_message>
Add relay output indications to g65_circuit_diagram.pptx
</commit_message>
<xml_diff>
--- a/images/g65_circuit_diagram.pptx
+++ b/images/g65_circuit_diagram.pptx
@@ -104,6 +104,11 @@
       </a:defRPr>
     </a:lvl9pPr>
   </p:defaultTextStyle>
+  <p:extLst>
+    <p:ext uri="{EFAFB233-063F-42B5-8137-9DF3F51BA10A}">
+      <p15:sldGuideLst xmlns:p15="http://schemas.microsoft.com/office/powerpoint/2012/main"/>
+    </p:ext>
+  </p:extLst>
 </p:presentation>
 </file>
 
@@ -4040,7 +4045,7 @@
         </p:blipFill>
         <p:spPr>
           <a:xfrm>
-            <a:off x="88309" y="883363"/>
+            <a:off x="250315" y="907838"/>
             <a:ext cx="3049362" cy="2309924"/>
           </a:xfrm>
           <a:prstGeom prst="rect">
@@ -4650,6 +4655,88 @@
           </a:fontRef>
         </p:style>
       </p:cxnSp>
+      <p:sp>
+        <p:nvSpPr>
+          <p:cNvPr id="2" name="TextBox 1">
+            <a:extLst>
+              <a:ext uri="{FF2B5EF4-FFF2-40B4-BE49-F238E27FC236}">
+                <a16:creationId xmlns:a16="http://schemas.microsoft.com/office/drawing/2014/main" id="{A2B8629A-5F3A-4BFB-BE44-2B255D4AC5C3}"/>
+              </a:ext>
+            </a:extLst>
+          </p:cNvPr>
+          <p:cNvSpPr txBox="1"/>
+          <p:nvPr/>
+        </p:nvSpPr>
+        <p:spPr>
+          <a:xfrm flipH="1">
+            <a:off x="-8234" y="1277462"/>
+            <a:ext cx="360728" cy="738664"/>
+          </a:xfrm>
+          <a:prstGeom prst="rect">
+            <a:avLst/>
+          </a:prstGeom>
+          <a:noFill/>
+        </p:spPr>
+        <p:txBody>
+          <a:bodyPr wrap="square" rtlCol="0">
+            <a:spAutoFit/>
+          </a:bodyPr>
+          <a:lstStyle/>
+          <a:p>
+            <a:r>
+              <a:rPr lang="en-US" sz="1400" dirty="0"/>
+              <a:t>F</a:t>
+            </a:r>
+          </a:p>
+          <a:p>
+            <a:r>
+              <a:rPr lang="en-US" sz="1400" dirty="0"/>
+              <a:t>A</a:t>
+            </a:r>
+          </a:p>
+          <a:p>
+            <a:r>
+              <a:rPr lang="en-US" sz="1400" dirty="0"/>
+              <a:t>N</a:t>
+            </a:r>
+          </a:p>
+        </p:txBody>
+      </p:sp>
+      <p:sp>
+        <p:nvSpPr>
+          <p:cNvPr id="36" name="TextBox 35">
+            <a:extLst>
+              <a:ext uri="{FF2B5EF4-FFF2-40B4-BE49-F238E27FC236}">
+                <a16:creationId xmlns:a16="http://schemas.microsoft.com/office/drawing/2014/main" id="{6EC73314-6D90-4CBA-894D-B2CBC182B275}"/>
+              </a:ext>
+            </a:extLst>
+          </p:cNvPr>
+          <p:cNvSpPr txBox="1"/>
+          <p:nvPr/>
+        </p:nvSpPr>
+        <p:spPr>
+          <a:xfrm flipH="1">
+            <a:off x="-8234" y="2068918"/>
+            <a:ext cx="360728" cy="954107"/>
+          </a:xfrm>
+          <a:prstGeom prst="rect">
+            <a:avLst/>
+          </a:prstGeom>
+          <a:noFill/>
+        </p:spPr>
+        <p:txBody>
+          <a:bodyPr wrap="square" rtlCol="0">
+            <a:spAutoFit/>
+          </a:bodyPr>
+          <a:lstStyle/>
+          <a:p>
+            <a:r>
+              <a:rPr lang="en-US" sz="1400" dirty="0"/>
+              <a:t>COMP</a:t>
+            </a:r>
+          </a:p>
+        </p:txBody>
+      </p:sp>
     </p:spTree>
     <p:extLst>
       <p:ext uri="{BB962C8B-B14F-4D97-AF65-F5344CB8AC3E}">

</xml_diff>